<commit_message>
added pie chart to the presntation
</commit_message>
<xml_diff>
--- a/Presentation/proposal presentation.pptx
+++ b/Presentation/proposal presentation.pptx
@@ -114,6 +114,889 @@
     </p:ext>
   </p:extLst>
 </p:presentation>
+</file>
+
+<file path=ppt/charts/chart1.xml><?xml version="1.0" encoding="utf-8"?>
+<c:chartSpace xmlns:c="http://schemas.openxmlformats.org/drawingml/2006/chart" xmlns:a="http://schemas.openxmlformats.org/drawingml/2006/main" xmlns:r="http://schemas.openxmlformats.org/officeDocument/2006/relationships">
+  <c:date1904 val="0"/>
+  <c:lang val="en-US"/>
+  <c:roundedCorners val="0"/>
+  <mc:AlternateContent xmlns:mc="http://schemas.openxmlformats.org/markup-compatibility/2006">
+    <mc:Choice xmlns:c14="http://schemas.microsoft.com/office/drawing/2007/8/2/chart" Requires="c14">
+      <c14:style val="102"/>
+    </mc:Choice>
+    <mc:Fallback>
+      <c:style val="2"/>
+    </mc:Fallback>
+  </mc:AlternateContent>
+  <c:chart>
+    <c:autoTitleDeleted val="1"/>
+    <c:plotArea>
+      <c:layout/>
+      <c:pieChart>
+        <c:varyColors val="1"/>
+        <c:ser>
+          <c:idx val="0"/>
+          <c:order val="0"/>
+          <c:tx>
+            <c:strRef>
+              <c:f>Sheet1!$B$1</c:f>
+              <c:strCache>
+                <c:ptCount val="1"/>
+                <c:pt idx="0">
+                  <c:v>Column1</c:v>
+                </c:pt>
+              </c:strCache>
+            </c:strRef>
+          </c:tx>
+          <c:dPt>
+            <c:idx val="0"/>
+            <c:bubble3D val="0"/>
+            <c:spPr>
+              <a:solidFill>
+                <a:schemeClr val="accent1"/>
+              </a:solidFill>
+              <a:ln w="19050">
+                <a:solidFill>
+                  <a:schemeClr val="lt1"/>
+                </a:solidFill>
+              </a:ln>
+              <a:effectLst/>
+            </c:spPr>
+          </c:dPt>
+          <c:dPt>
+            <c:idx val="1"/>
+            <c:bubble3D val="0"/>
+            <c:spPr>
+              <a:solidFill>
+                <a:schemeClr val="accent2"/>
+              </a:solidFill>
+              <a:ln w="19050">
+                <a:solidFill>
+                  <a:schemeClr val="lt1"/>
+                </a:solidFill>
+              </a:ln>
+              <a:effectLst/>
+            </c:spPr>
+          </c:dPt>
+          <c:dPt>
+            <c:idx val="2"/>
+            <c:bubble3D val="0"/>
+            <c:spPr>
+              <a:solidFill>
+                <a:schemeClr val="accent3"/>
+              </a:solidFill>
+              <a:ln w="19050">
+                <a:solidFill>
+                  <a:schemeClr val="lt1"/>
+                </a:solidFill>
+              </a:ln>
+              <a:effectLst/>
+            </c:spPr>
+          </c:dPt>
+          <c:dPt>
+            <c:idx val="3"/>
+            <c:bubble3D val="0"/>
+            <c:spPr>
+              <a:solidFill>
+                <a:schemeClr val="accent4"/>
+              </a:solidFill>
+              <a:ln w="19050">
+                <a:solidFill>
+                  <a:schemeClr val="lt1"/>
+                </a:solidFill>
+              </a:ln>
+              <a:effectLst/>
+            </c:spPr>
+          </c:dPt>
+          <c:dPt>
+            <c:idx val="4"/>
+            <c:bubble3D val="0"/>
+            <c:spPr>
+              <a:solidFill>
+                <a:schemeClr val="accent5"/>
+              </a:solidFill>
+              <a:ln w="19050">
+                <a:solidFill>
+                  <a:schemeClr val="lt1"/>
+                </a:solidFill>
+              </a:ln>
+              <a:effectLst/>
+            </c:spPr>
+          </c:dPt>
+          <c:dPt>
+            <c:idx val="5"/>
+            <c:bubble3D val="0"/>
+            <c:spPr>
+              <a:solidFill>
+                <a:schemeClr val="accent6"/>
+              </a:solidFill>
+              <a:ln w="19050">
+                <a:solidFill>
+                  <a:schemeClr val="lt1"/>
+                </a:solidFill>
+              </a:ln>
+              <a:effectLst/>
+            </c:spPr>
+          </c:dPt>
+          <c:dPt>
+            <c:idx val="6"/>
+            <c:bubble3D val="0"/>
+            <c:spPr>
+              <a:solidFill>
+                <a:schemeClr val="accent1">
+                  <a:lumMod val="60000"/>
+                </a:schemeClr>
+              </a:solidFill>
+              <a:ln w="19050">
+                <a:solidFill>
+                  <a:schemeClr val="lt1"/>
+                </a:solidFill>
+              </a:ln>
+              <a:effectLst/>
+            </c:spPr>
+          </c:dPt>
+          <c:dPt>
+            <c:idx val="7"/>
+            <c:bubble3D val="0"/>
+            <c:spPr>
+              <a:solidFill>
+                <a:schemeClr val="accent2">
+                  <a:lumMod val="60000"/>
+                </a:schemeClr>
+              </a:solidFill>
+              <a:ln w="19050">
+                <a:solidFill>
+                  <a:schemeClr val="lt1"/>
+                </a:solidFill>
+              </a:ln>
+              <a:effectLst/>
+            </c:spPr>
+          </c:dPt>
+          <c:dPt>
+            <c:idx val="8"/>
+            <c:bubble3D val="0"/>
+            <c:spPr>
+              <a:solidFill>
+                <a:schemeClr val="accent3">
+                  <a:lumMod val="60000"/>
+                </a:schemeClr>
+              </a:solidFill>
+              <a:ln w="19050">
+                <a:solidFill>
+                  <a:schemeClr val="lt1"/>
+                </a:solidFill>
+              </a:ln>
+              <a:effectLst/>
+            </c:spPr>
+          </c:dPt>
+          <c:cat>
+            <c:strRef>
+              <c:f>Sheet1!$A$2:$A$10</c:f>
+              <c:strCache>
+                <c:ptCount val="9"/>
+                <c:pt idx="0">
+                  <c:v>Computation Module</c:v>
+                </c:pt>
+                <c:pt idx="1">
+                  <c:v>GPS</c:v>
+                </c:pt>
+                <c:pt idx="2">
+                  <c:v>IMU</c:v>
+                </c:pt>
+                <c:pt idx="3">
+                  <c:v>WiFi</c:v>
+                </c:pt>
+                <c:pt idx="4">
+                  <c:v>Xbee</c:v>
+                </c:pt>
+                <c:pt idx="5">
+                  <c:v>SD Card</c:v>
+                </c:pt>
+                <c:pt idx="6">
+                  <c:v>Battery</c:v>
+                </c:pt>
+                <c:pt idx="7">
+                  <c:v>Node Casing</c:v>
+                </c:pt>
+                <c:pt idx="8">
+                  <c:v>Wires</c:v>
+                </c:pt>
+              </c:strCache>
+            </c:strRef>
+          </c:cat>
+          <c:val>
+            <c:numRef>
+              <c:f>Sheet1!$B$2:$B$10</c:f>
+              <c:numCache>
+                <c:formatCode>General</c:formatCode>
+                <c:ptCount val="9"/>
+                <c:pt idx="0">
+                  <c:v>39.950000000000003</c:v>
+                </c:pt>
+                <c:pt idx="1">
+                  <c:v>39.950000000000003</c:v>
+                </c:pt>
+                <c:pt idx="2">
+                  <c:v>19.95</c:v>
+                </c:pt>
+                <c:pt idx="3">
+                  <c:v>8.6999999999999993</c:v>
+                </c:pt>
+                <c:pt idx="4">
+                  <c:v>50</c:v>
+                </c:pt>
+                <c:pt idx="5">
+                  <c:v>9.99</c:v>
+                </c:pt>
+                <c:pt idx="6">
+                  <c:v>25</c:v>
+                </c:pt>
+                <c:pt idx="7">
+                  <c:v>25</c:v>
+                </c:pt>
+                <c:pt idx="8">
+                  <c:v>3.41</c:v>
+                </c:pt>
+              </c:numCache>
+            </c:numRef>
+          </c:val>
+        </c:ser>
+        <c:dLbls>
+          <c:showLegendKey val="0"/>
+          <c:showVal val="0"/>
+          <c:showCatName val="0"/>
+          <c:showSerName val="0"/>
+          <c:showPercent val="0"/>
+          <c:showBubbleSize val="0"/>
+          <c:showLeaderLines val="1"/>
+        </c:dLbls>
+        <c:firstSliceAng val="0"/>
+      </c:pieChart>
+      <c:spPr>
+        <a:noFill/>
+        <a:ln>
+          <a:noFill/>
+        </a:ln>
+        <a:effectLst/>
+      </c:spPr>
+    </c:plotArea>
+    <c:legend>
+      <c:legendPos val="b"/>
+      <c:layout/>
+      <c:overlay val="0"/>
+      <c:spPr>
+        <a:noFill/>
+        <a:ln>
+          <a:noFill/>
+        </a:ln>
+        <a:effectLst/>
+      </c:spPr>
+      <c:txPr>
+        <a:bodyPr rot="0" spcFirstLastPara="1" vertOverflow="ellipsis" vert="horz" wrap="square" anchor="ctr" anchorCtr="1"/>
+        <a:lstStyle/>
+        <a:p>
+          <a:pPr>
+            <a:defRPr sz="1197" b="0" i="0" u="none" strike="noStrike" kern="1200" baseline="0">
+              <a:solidFill>
+                <a:schemeClr val="tx1">
+                  <a:lumMod val="65000"/>
+                  <a:lumOff val="35000"/>
+                </a:schemeClr>
+              </a:solidFill>
+              <a:latin typeface="+mn-lt"/>
+              <a:ea typeface="+mn-ea"/>
+              <a:cs typeface="+mn-cs"/>
+            </a:defRPr>
+          </a:pPr>
+          <a:endParaRPr lang="en-US"/>
+        </a:p>
+      </c:txPr>
+    </c:legend>
+    <c:plotVisOnly val="1"/>
+    <c:dispBlanksAs val="gap"/>
+    <c:showDLblsOverMax val="0"/>
+  </c:chart>
+  <c:spPr>
+    <a:noFill/>
+    <a:ln>
+      <a:noFill/>
+    </a:ln>
+    <a:effectLst/>
+  </c:spPr>
+  <c:txPr>
+    <a:bodyPr/>
+    <a:lstStyle/>
+    <a:p>
+      <a:pPr>
+        <a:defRPr/>
+      </a:pPr>
+      <a:endParaRPr lang="en-US"/>
+    </a:p>
+  </c:txPr>
+  <c:externalData r:id="rId3">
+    <c:autoUpdate val="0"/>
+  </c:externalData>
+</c:chartSpace>
+</file>
+
+<file path=ppt/charts/colors1.xml><?xml version="1.0" encoding="utf-8"?>
+<cs:colorStyle xmlns:cs="http://schemas.microsoft.com/office/drawing/2012/chartStyle" xmlns:a="http://schemas.openxmlformats.org/drawingml/2006/main" meth="cycle" id="10">
+  <a:schemeClr val="accent1"/>
+  <a:schemeClr val="accent2"/>
+  <a:schemeClr val="accent3"/>
+  <a:schemeClr val="accent4"/>
+  <a:schemeClr val="accent5"/>
+  <a:schemeClr val="accent6"/>
+  <cs:variation/>
+  <cs:variation>
+    <a:lumMod val="60000"/>
+  </cs:variation>
+  <cs:variation>
+    <a:lumMod val="80000"/>
+    <a:lumOff val="20000"/>
+  </cs:variation>
+  <cs:variation>
+    <a:lumMod val="80000"/>
+  </cs:variation>
+  <cs:variation>
+    <a:lumMod val="60000"/>
+    <a:lumOff val="40000"/>
+  </cs:variation>
+  <cs:variation>
+    <a:lumMod val="50000"/>
+  </cs:variation>
+  <cs:variation>
+    <a:lumMod val="70000"/>
+    <a:lumOff val="30000"/>
+  </cs:variation>
+  <cs:variation>
+    <a:lumMod val="70000"/>
+  </cs:variation>
+  <cs:variation>
+    <a:lumMod val="50000"/>
+    <a:lumOff val="50000"/>
+  </cs:variation>
+</cs:colorStyle>
+</file>
+
+<file path=ppt/charts/style1.xml><?xml version="1.0" encoding="utf-8"?>
+<cs:chartStyle xmlns:cs="http://schemas.microsoft.com/office/drawing/2012/chartStyle" xmlns:a="http://schemas.openxmlformats.org/drawingml/2006/main" id="251">
+  <cs:axisTitle>
+    <cs:lnRef idx="0"/>
+    <cs:fillRef idx="0"/>
+    <cs:effectRef idx="0"/>
+    <cs:fontRef idx="minor">
+      <a:schemeClr val="tx1">
+        <a:lumMod val="65000"/>
+        <a:lumOff val="35000"/>
+      </a:schemeClr>
+    </cs:fontRef>
+    <cs:defRPr sz="1330" kern="1200"/>
+  </cs:axisTitle>
+  <cs:categoryAxis>
+    <cs:lnRef idx="0"/>
+    <cs:fillRef idx="0"/>
+    <cs:effectRef idx="0"/>
+    <cs:fontRef idx="minor">
+      <a:schemeClr val="tx1">
+        <a:lumMod val="65000"/>
+        <a:lumOff val="35000"/>
+      </a:schemeClr>
+    </cs:fontRef>
+    <cs:spPr>
+      <a:ln w="9525" cap="flat" cmpd="sng" algn="ctr">
+        <a:solidFill>
+          <a:schemeClr val="tx1">
+            <a:lumMod val="15000"/>
+            <a:lumOff val="85000"/>
+          </a:schemeClr>
+        </a:solidFill>
+        <a:round/>
+      </a:ln>
+    </cs:spPr>
+    <cs:defRPr sz="1197" kern="1200"/>
+  </cs:categoryAxis>
+  <cs:chartArea mods="allowNoFillOverride allowNoLineOverride">
+    <cs:lnRef idx="0"/>
+    <cs:fillRef idx="0"/>
+    <cs:effectRef idx="0"/>
+    <cs:fontRef idx="minor">
+      <a:schemeClr val="tx1"/>
+    </cs:fontRef>
+    <cs:spPr>
+      <a:solidFill>
+        <a:schemeClr val="bg1"/>
+      </a:solidFill>
+      <a:ln w="9525" cap="flat" cmpd="sng" algn="ctr">
+        <a:solidFill>
+          <a:schemeClr val="tx1">
+            <a:lumMod val="15000"/>
+            <a:lumOff val="85000"/>
+          </a:schemeClr>
+        </a:solidFill>
+        <a:round/>
+      </a:ln>
+    </cs:spPr>
+    <cs:defRPr sz="1197" kern="1200"/>
+  </cs:chartArea>
+  <cs:dataLabel>
+    <cs:lnRef idx="0"/>
+    <cs:fillRef idx="0"/>
+    <cs:effectRef idx="0"/>
+    <cs:fontRef idx="minor">
+      <a:schemeClr val="tx1">
+        <a:lumMod val="75000"/>
+        <a:lumOff val="25000"/>
+      </a:schemeClr>
+    </cs:fontRef>
+    <cs:defRPr sz="1197" kern="1200"/>
+  </cs:dataLabel>
+  <cs:dataLabelCallout>
+    <cs:lnRef idx="0"/>
+    <cs:fillRef idx="0"/>
+    <cs:effectRef idx="0"/>
+    <cs:fontRef idx="minor">
+      <a:schemeClr val="dk1">
+        <a:lumMod val="65000"/>
+        <a:lumOff val="35000"/>
+      </a:schemeClr>
+    </cs:fontRef>
+    <cs:spPr>
+      <a:solidFill>
+        <a:schemeClr val="lt1"/>
+      </a:solidFill>
+      <a:ln>
+        <a:solidFill>
+          <a:schemeClr val="dk1">
+            <a:lumMod val="25000"/>
+            <a:lumOff val="75000"/>
+          </a:schemeClr>
+        </a:solidFill>
+      </a:ln>
+    </cs:spPr>
+    <cs:defRPr sz="1197" kern="1200"/>
+    <cs:bodyPr rot="0" spcFirstLastPara="1" vertOverflow="clip" horzOverflow="clip" vert="horz" wrap="square" lIns="36576" tIns="18288" rIns="36576" bIns="18288" anchor="ctr" anchorCtr="1">
+      <a:spAutoFit/>
+    </cs:bodyPr>
+  </cs:dataLabelCallout>
+  <cs:dataPoint>
+    <cs:lnRef idx="0"/>
+    <cs:fillRef idx="1">
+      <cs:styleClr val="auto"/>
+    </cs:fillRef>
+    <cs:effectRef idx="0"/>
+    <cs:fontRef idx="minor">
+      <a:schemeClr val="tx1"/>
+    </cs:fontRef>
+    <cs:spPr>
+      <a:ln w="19050">
+        <a:solidFill>
+          <a:schemeClr val="lt1"/>
+        </a:solidFill>
+      </a:ln>
+    </cs:spPr>
+  </cs:dataPoint>
+  <cs:dataPoint3D>
+    <cs:lnRef idx="0"/>
+    <cs:fillRef idx="1">
+      <cs:styleClr val="auto"/>
+    </cs:fillRef>
+    <cs:effectRef idx="0"/>
+    <cs:fontRef idx="minor">
+      <a:schemeClr val="tx1"/>
+    </cs:fontRef>
+    <cs:spPr>
+      <a:ln w="25400">
+        <a:solidFill>
+          <a:schemeClr val="lt1"/>
+        </a:solidFill>
+      </a:ln>
+    </cs:spPr>
+  </cs:dataPoint3D>
+  <cs:dataPointLine>
+    <cs:lnRef idx="0">
+      <cs:styleClr val="auto"/>
+    </cs:lnRef>
+    <cs:fillRef idx="0"/>
+    <cs:effectRef idx="0"/>
+    <cs:fontRef idx="minor">
+      <a:schemeClr val="tx1"/>
+    </cs:fontRef>
+    <cs:spPr>
+      <a:ln w="28575" cap="rnd">
+        <a:solidFill>
+          <a:schemeClr val="phClr"/>
+        </a:solidFill>
+        <a:round/>
+      </a:ln>
+    </cs:spPr>
+  </cs:dataPointLine>
+  <cs:dataPointMarker>
+    <cs:lnRef idx="0">
+      <cs:styleClr val="auto"/>
+    </cs:lnRef>
+    <cs:fillRef idx="1">
+      <cs:styleClr val="auto"/>
+    </cs:fillRef>
+    <cs:effectRef idx="0"/>
+    <cs:fontRef idx="minor">
+      <a:schemeClr val="tx1"/>
+    </cs:fontRef>
+    <cs:spPr>
+      <a:ln w="9525">
+        <a:solidFill>
+          <a:schemeClr val="phClr"/>
+        </a:solidFill>
+      </a:ln>
+    </cs:spPr>
+  </cs:dataPointMarker>
+  <cs:dataPointMarkerLayout symbol="circle" size="5"/>
+  <cs:dataPointWireframe>
+    <cs:lnRef idx="0">
+      <cs:styleClr val="auto"/>
+    </cs:lnRef>
+    <cs:fillRef idx="0"/>
+    <cs:effectRef idx="0"/>
+    <cs:fontRef idx="minor">
+      <a:schemeClr val="tx1"/>
+    </cs:fontRef>
+    <cs:spPr>
+      <a:ln w="9525" cap="rnd">
+        <a:solidFill>
+          <a:schemeClr val="phClr"/>
+        </a:solidFill>
+        <a:round/>
+      </a:ln>
+    </cs:spPr>
+  </cs:dataPointWireframe>
+  <cs:dataTable>
+    <cs:lnRef idx="0"/>
+    <cs:fillRef idx="0"/>
+    <cs:effectRef idx="0"/>
+    <cs:fontRef idx="minor">
+      <a:schemeClr val="tx1">
+        <a:lumMod val="65000"/>
+        <a:lumOff val="35000"/>
+      </a:schemeClr>
+    </cs:fontRef>
+    <cs:spPr>
+      <a:noFill/>
+      <a:ln w="9525" cap="flat" cmpd="sng" algn="ctr">
+        <a:solidFill>
+          <a:schemeClr val="tx1">
+            <a:lumMod val="15000"/>
+            <a:lumOff val="85000"/>
+          </a:schemeClr>
+        </a:solidFill>
+        <a:round/>
+      </a:ln>
+    </cs:spPr>
+    <cs:defRPr sz="1197" kern="1200"/>
+  </cs:dataTable>
+  <cs:downBar>
+    <cs:lnRef idx="0"/>
+    <cs:fillRef idx="0"/>
+    <cs:effectRef idx="0"/>
+    <cs:fontRef idx="minor">
+      <a:schemeClr val="tx1"/>
+    </cs:fontRef>
+    <cs:spPr>
+      <a:solidFill>
+        <a:schemeClr val="dk1">
+          <a:lumMod val="75000"/>
+          <a:lumOff val="25000"/>
+        </a:schemeClr>
+      </a:solidFill>
+      <a:ln w="9525" cap="flat" cmpd="sng" algn="ctr">
+        <a:solidFill>
+          <a:schemeClr val="tx1">
+            <a:lumMod val="65000"/>
+            <a:lumOff val="35000"/>
+          </a:schemeClr>
+        </a:solidFill>
+        <a:round/>
+      </a:ln>
+    </cs:spPr>
+  </cs:downBar>
+  <cs:dropLine>
+    <cs:lnRef idx="0"/>
+    <cs:fillRef idx="0"/>
+    <cs:effectRef idx="0"/>
+    <cs:fontRef idx="minor">
+      <a:schemeClr val="tx1"/>
+    </cs:fontRef>
+    <cs:spPr>
+      <a:ln w="9525" cap="flat" cmpd="sng" algn="ctr">
+        <a:solidFill>
+          <a:schemeClr val="tx1">
+            <a:lumMod val="35000"/>
+            <a:lumOff val="65000"/>
+          </a:schemeClr>
+        </a:solidFill>
+        <a:round/>
+      </a:ln>
+    </cs:spPr>
+  </cs:dropLine>
+  <cs:errorBar>
+    <cs:lnRef idx="0"/>
+    <cs:fillRef idx="0"/>
+    <cs:effectRef idx="0"/>
+    <cs:fontRef idx="minor">
+      <a:schemeClr val="tx1"/>
+    </cs:fontRef>
+    <cs:spPr>
+      <a:ln w="9525" cap="flat" cmpd="sng" algn="ctr">
+        <a:solidFill>
+          <a:schemeClr val="tx1">
+            <a:lumMod val="65000"/>
+            <a:lumOff val="35000"/>
+          </a:schemeClr>
+        </a:solidFill>
+        <a:round/>
+      </a:ln>
+    </cs:spPr>
+  </cs:errorBar>
+  <cs:floor>
+    <cs:lnRef idx="0"/>
+    <cs:fillRef idx="0"/>
+    <cs:effectRef idx="0"/>
+    <cs:fontRef idx="minor">
+      <a:schemeClr val="tx1"/>
+    </cs:fontRef>
+    <cs:spPr>
+      <a:noFill/>
+      <a:ln>
+        <a:noFill/>
+      </a:ln>
+    </cs:spPr>
+  </cs:floor>
+  <cs:gridlineMajor>
+    <cs:lnRef idx="0"/>
+    <cs:fillRef idx="0"/>
+    <cs:effectRef idx="0"/>
+    <cs:fontRef idx="minor">
+      <a:schemeClr val="tx1"/>
+    </cs:fontRef>
+    <cs:spPr>
+      <a:ln w="9525" cap="flat" cmpd="sng" algn="ctr">
+        <a:solidFill>
+          <a:schemeClr val="tx1">
+            <a:lumMod val="15000"/>
+            <a:lumOff val="85000"/>
+          </a:schemeClr>
+        </a:solidFill>
+        <a:round/>
+      </a:ln>
+    </cs:spPr>
+  </cs:gridlineMajor>
+  <cs:gridlineMinor>
+    <cs:lnRef idx="0"/>
+    <cs:fillRef idx="0"/>
+    <cs:effectRef idx="0"/>
+    <cs:fontRef idx="minor">
+      <a:schemeClr val="tx1"/>
+    </cs:fontRef>
+    <cs:spPr>
+      <a:ln w="9525" cap="flat" cmpd="sng" algn="ctr">
+        <a:solidFill>
+          <a:schemeClr val="tx1">
+            <a:lumMod val="5000"/>
+            <a:lumOff val="95000"/>
+          </a:schemeClr>
+        </a:solidFill>
+        <a:round/>
+      </a:ln>
+    </cs:spPr>
+  </cs:gridlineMinor>
+  <cs:hiLoLine>
+    <cs:lnRef idx="0"/>
+    <cs:fillRef idx="0"/>
+    <cs:effectRef idx="0"/>
+    <cs:fontRef idx="minor">
+      <a:schemeClr val="tx1"/>
+    </cs:fontRef>
+    <cs:spPr>
+      <a:ln w="9525" cap="flat" cmpd="sng" algn="ctr">
+        <a:solidFill>
+          <a:schemeClr val="tx1">
+            <a:lumMod val="50000"/>
+            <a:lumOff val="50000"/>
+          </a:schemeClr>
+        </a:solidFill>
+        <a:round/>
+      </a:ln>
+    </cs:spPr>
+  </cs:hiLoLine>
+  <cs:leaderLine>
+    <cs:lnRef idx="0"/>
+    <cs:fillRef idx="0"/>
+    <cs:effectRef idx="0"/>
+    <cs:fontRef idx="minor">
+      <a:schemeClr val="tx1"/>
+    </cs:fontRef>
+    <cs:spPr>
+      <a:ln w="9525" cap="flat" cmpd="sng" algn="ctr">
+        <a:solidFill>
+          <a:schemeClr val="tx1">
+            <a:lumMod val="35000"/>
+            <a:lumOff val="65000"/>
+          </a:schemeClr>
+        </a:solidFill>
+        <a:round/>
+      </a:ln>
+    </cs:spPr>
+  </cs:leaderLine>
+  <cs:legend>
+    <cs:lnRef idx="0"/>
+    <cs:fillRef idx="0"/>
+    <cs:effectRef idx="0"/>
+    <cs:fontRef idx="minor">
+      <a:schemeClr val="tx1">
+        <a:lumMod val="65000"/>
+        <a:lumOff val="35000"/>
+      </a:schemeClr>
+    </cs:fontRef>
+    <cs:defRPr sz="1197" kern="1200"/>
+  </cs:legend>
+  <cs:plotArea mods="allowNoFillOverride allowNoLineOverride">
+    <cs:lnRef idx="0"/>
+    <cs:fillRef idx="0"/>
+    <cs:effectRef idx="0"/>
+    <cs:fontRef idx="minor">
+      <a:schemeClr val="tx1"/>
+    </cs:fontRef>
+  </cs:plotArea>
+  <cs:plotArea3D mods="allowNoFillOverride allowNoLineOverride">
+    <cs:lnRef idx="0"/>
+    <cs:fillRef idx="0"/>
+    <cs:effectRef idx="0"/>
+    <cs:fontRef idx="minor">
+      <a:schemeClr val="tx1"/>
+    </cs:fontRef>
+  </cs:plotArea3D>
+  <cs:seriesAxis>
+    <cs:lnRef idx="0"/>
+    <cs:fillRef idx="0"/>
+    <cs:effectRef idx="0"/>
+    <cs:fontRef idx="minor">
+      <a:schemeClr val="tx1">
+        <a:lumMod val="65000"/>
+        <a:lumOff val="35000"/>
+      </a:schemeClr>
+    </cs:fontRef>
+    <cs:defRPr sz="1197" kern="1200"/>
+  </cs:seriesAxis>
+  <cs:seriesLine>
+    <cs:lnRef idx="0"/>
+    <cs:fillRef idx="0"/>
+    <cs:effectRef idx="0"/>
+    <cs:fontRef idx="minor">
+      <a:schemeClr val="tx1"/>
+    </cs:fontRef>
+    <cs:spPr>
+      <a:ln w="9525" cap="flat" cmpd="sng" algn="ctr">
+        <a:solidFill>
+          <a:schemeClr val="tx1">
+            <a:lumMod val="35000"/>
+            <a:lumOff val="65000"/>
+          </a:schemeClr>
+        </a:solidFill>
+        <a:round/>
+      </a:ln>
+    </cs:spPr>
+  </cs:seriesLine>
+  <cs:title>
+    <cs:lnRef idx="0"/>
+    <cs:fillRef idx="0"/>
+    <cs:effectRef idx="0"/>
+    <cs:fontRef idx="minor">
+      <a:schemeClr val="tx1">
+        <a:lumMod val="65000"/>
+        <a:lumOff val="35000"/>
+      </a:schemeClr>
+    </cs:fontRef>
+    <cs:defRPr sz="1862" b="0" kern="1200" spc="0" baseline="0"/>
+  </cs:title>
+  <cs:trendline>
+    <cs:lnRef idx="0">
+      <cs:styleClr val="auto"/>
+    </cs:lnRef>
+    <cs:fillRef idx="0"/>
+    <cs:effectRef idx="0"/>
+    <cs:fontRef idx="minor">
+      <a:schemeClr val="tx1"/>
+    </cs:fontRef>
+    <cs:spPr>
+      <a:ln w="19050" cap="rnd">
+        <a:solidFill>
+          <a:schemeClr val="phClr"/>
+        </a:solidFill>
+        <a:prstDash val="sysDot"/>
+      </a:ln>
+    </cs:spPr>
+  </cs:trendline>
+  <cs:trendlineLabel>
+    <cs:lnRef idx="0"/>
+    <cs:fillRef idx="0"/>
+    <cs:effectRef idx="0"/>
+    <cs:fontRef idx="minor">
+      <a:schemeClr val="tx1">
+        <a:lumMod val="65000"/>
+        <a:lumOff val="35000"/>
+      </a:schemeClr>
+    </cs:fontRef>
+    <cs:defRPr sz="1197" kern="1200"/>
+  </cs:trendlineLabel>
+  <cs:upBar>
+    <cs:lnRef idx="0"/>
+    <cs:fillRef idx="0"/>
+    <cs:effectRef idx="0"/>
+    <cs:fontRef idx="minor">
+      <a:schemeClr val="tx1"/>
+    </cs:fontRef>
+    <cs:spPr>
+      <a:solidFill>
+        <a:schemeClr val="lt1"/>
+      </a:solidFill>
+      <a:ln w="9525" cap="flat" cmpd="sng" algn="ctr">
+        <a:solidFill>
+          <a:schemeClr val="tx1">
+            <a:lumMod val="65000"/>
+            <a:lumOff val="35000"/>
+          </a:schemeClr>
+        </a:solidFill>
+        <a:round/>
+      </a:ln>
+    </cs:spPr>
+  </cs:upBar>
+  <cs:valueAxis>
+    <cs:lnRef idx="0"/>
+    <cs:fillRef idx="0"/>
+    <cs:effectRef idx="0"/>
+    <cs:fontRef idx="minor">
+      <a:schemeClr val="tx1">
+        <a:lumMod val="65000"/>
+        <a:lumOff val="35000"/>
+      </a:schemeClr>
+    </cs:fontRef>
+    <cs:defRPr sz="1197" kern="1200"/>
+  </cs:valueAxis>
+  <cs:wall>
+    <cs:lnRef idx="0"/>
+    <cs:fillRef idx="0"/>
+    <cs:effectRef idx="0"/>
+    <cs:fontRef idx="minor">
+      <a:schemeClr val="tx1"/>
+    </cs:fontRef>
+    <cs:spPr>
+      <a:noFill/>
+      <a:ln>
+        <a:noFill/>
+      </a:ln>
+    </cs:spPr>
+  </cs:wall>
+</cs:chartStyle>
 </file>
 
 <file path=ppt/slideLayouts/slideLayout1.xml><?xml version="1.0" encoding="utf-8"?>
@@ -6316,11 +7199,7 @@
             <a:pPr lvl="1"/>
             <a:r>
               <a:rPr lang="en-US" dirty="0" smtClean="0"/>
-              <a:t>Node Casing - </a:t>
-            </a:r>
-            <a:r>
-              <a:rPr lang="en-US" dirty="0" smtClean="0"/>
-              <a:t>~$25</a:t>
+              <a:t>Node Casing - ~$25</a:t>
             </a:r>
           </a:p>
           <a:p>
@@ -6333,6 +7212,28 @@
           </a:p>
         </p:txBody>
       </p:sp>
+      <p:graphicFrame>
+        <p:nvGraphicFramePr>
+          <p:cNvPr id="7" name="Chart 6"/>
+          <p:cNvGraphicFramePr/>
+          <p:nvPr>
+            <p:extLst>
+              <p:ext uri="{D42A27DB-BD31-4B8C-83A1-F6EECF244321}">
+                <p14:modId xmlns:p14="http://schemas.microsoft.com/office/powerpoint/2010/main" val="1729272253"/>
+              </p:ext>
+            </p:extLst>
+          </p:nvPr>
+        </p:nvGraphicFramePr>
+        <p:xfrm>
+          <a:off x="4191876" y="1050742"/>
+          <a:ext cx="8128000" cy="5418667"/>
+        </p:xfrm>
+        <a:graphic>
+          <a:graphicData uri="http://schemas.openxmlformats.org/drawingml/2006/chart">
+            <c:chart xmlns:c="http://schemas.openxmlformats.org/drawingml/2006/chart" xmlns:r="http://schemas.openxmlformats.org/officeDocument/2006/relationships" r:id="rId2"/>
+          </a:graphicData>
+        </a:graphic>
+      </p:graphicFrame>
     </p:spTree>
     <p:extLst>
       <p:ext uri="{BB962C8B-B14F-4D97-AF65-F5344CB8AC3E}">

</xml_diff>